<commit_message>
5/18/2023: Added combination_plot.png to Resources folder. Added last names to slide.
</commit_message>
<xml_diff>
--- a/Group_7_Presentation.pptx
+++ b/Group_7_Presentation.pptx
@@ -5844,7 +5844,7 @@
         <p:spPr/>
         <p:txBody>
           <a:bodyPr>
-            <a:normAutofit fontScale="92500"/>
+            <a:normAutofit fontScale="92500" lnSpcReduction="10000"/>
           </a:bodyPr>
           <a:lstStyle/>
           <a:p>
@@ -5860,7 +5860,7 @@
                   <a:schemeClr val="tx1"/>
                 </a:solidFill>
               </a:rPr>
-              <a:t>Kendal Bergman, Joanna DeLaune, Aaliyah Lockett, Evan, Greg </a:t>
+              <a:t>Kendal Bergman, Joanna DeLaune, Aaliyah Lockett, Greg Michalak, Evan Sprecher</a:t>
             </a:r>
           </a:p>
         </p:txBody>

</xml_diff>